<commit_message>
Final updates before today's IAM session
</commit_message>
<xml_diff>
--- a/02-identity-and-access-management/02-identity-and-access-management.pptx
+++ b/02-identity-and-access-management/02-identity-and-access-management.pptx
@@ -207,7 +207,7 @@
           <a:p>
             <a:fld id="{926F5171-4620-824D-BBEE-9B12D10DDA40}" type="datetimeFigureOut">
               <a:rPr lang="en-US" smtClean="0"/>
-              <a:t>6/8/21</a:t>
+              <a:t>6/11/21</a:t>
             </a:fld>
             <a:endParaRPr lang="en-US"/>
           </a:p>
@@ -1147,7 +1147,7 @@
           <a:p>
             <a:fld id="{5940F215-8337-114F-9F3D-71B1107C1CD3}" type="datetimeFigureOut">
               <a:rPr lang="en-US" smtClean="0"/>
-              <a:t>6/8/21</a:t>
+              <a:t>6/11/21</a:t>
             </a:fld>
             <a:endParaRPr lang="en-US"/>
           </a:p>
@@ -1371,7 +1371,7 @@
           <a:p>
             <a:fld id="{5940F215-8337-114F-9F3D-71B1107C1CD3}" type="datetimeFigureOut">
               <a:rPr lang="en-US" smtClean="0"/>
-              <a:t>6/8/21</a:t>
+              <a:t>6/11/21</a:t>
             </a:fld>
             <a:endParaRPr lang="en-US"/>
           </a:p>
@@ -1605,7 +1605,7 @@
           <a:p>
             <a:fld id="{5940F215-8337-114F-9F3D-71B1107C1CD3}" type="datetimeFigureOut">
               <a:rPr lang="en-US" smtClean="0"/>
-              <a:t>6/8/21</a:t>
+              <a:t>6/11/21</a:t>
             </a:fld>
             <a:endParaRPr lang="en-US"/>
           </a:p>
@@ -1999,7 +1999,7 @@
           <a:p>
             <a:fld id="{5940F215-8337-114F-9F3D-71B1107C1CD3}" type="datetimeFigureOut">
               <a:rPr lang="en-US" smtClean="0"/>
-              <a:t>6/8/21</a:t>
+              <a:t>6/11/21</a:t>
             </a:fld>
             <a:endParaRPr lang="en-US"/>
           </a:p>
@@ -2431,7 +2431,7 @@
           <a:p>
             <a:fld id="{5940F215-8337-114F-9F3D-71B1107C1CD3}" type="datetimeFigureOut">
               <a:rPr lang="en-US" smtClean="0"/>
-              <a:t>6/8/21</a:t>
+              <a:t>6/11/21</a:t>
             </a:fld>
             <a:endParaRPr lang="en-US"/>
           </a:p>
@@ -2723,7 +2723,7 @@
           <a:p>
             <a:fld id="{5940F215-8337-114F-9F3D-71B1107C1CD3}" type="datetimeFigureOut">
               <a:rPr lang="en-US" smtClean="0"/>
-              <a:t>6/8/21</a:t>
+              <a:t>6/11/21</a:t>
             </a:fld>
             <a:endParaRPr lang="en-US"/>
           </a:p>
@@ -3162,7 +3162,7 @@
           <a:p>
             <a:fld id="{5940F215-8337-114F-9F3D-71B1107C1CD3}" type="datetimeFigureOut">
               <a:rPr lang="en-US" smtClean="0"/>
-              <a:t>6/8/21</a:t>
+              <a:t>6/11/21</a:t>
             </a:fld>
             <a:endParaRPr lang="en-US"/>
           </a:p>
@@ -3328,7 +3328,7 @@
           <a:p>
             <a:fld id="{5940F215-8337-114F-9F3D-71B1107C1CD3}" type="datetimeFigureOut">
               <a:rPr lang="en-US" smtClean="0"/>
-              <a:t>6/8/21</a:t>
+              <a:t>6/11/21</a:t>
             </a:fld>
             <a:endParaRPr lang="en-US"/>
           </a:p>
@@ -3465,7 +3465,7 @@
           <a:p>
             <a:fld id="{5940F215-8337-114F-9F3D-71B1107C1CD3}" type="datetimeFigureOut">
               <a:rPr lang="en-US" smtClean="0"/>
-              <a:t>6/8/21</a:t>
+              <a:t>6/11/21</a:t>
             </a:fld>
             <a:endParaRPr lang="en-US"/>
           </a:p>
@@ -3802,7 +3802,7 @@
           <a:p>
             <a:fld id="{5940F215-8337-114F-9F3D-71B1107C1CD3}" type="datetimeFigureOut">
               <a:rPr lang="en-US" smtClean="0"/>
-              <a:t>6/8/21</a:t>
+              <a:t>6/11/21</a:t>
             </a:fld>
             <a:endParaRPr lang="en-US"/>
           </a:p>
@@ -5917,13 +5917,13 @@
         </p:nvSpPr>
         <p:spPr>
           <a:xfrm>
-            <a:off x="9494385" y="2767052"/>
-            <a:ext cx="2435192" cy="1987827"/>
+            <a:off x="9561058" y="2767052"/>
+            <a:ext cx="2435192" cy="2815601"/>
           </a:xfrm>
           <a:prstGeom prst="wedgeRoundRectCallout">
             <a:avLst>
-              <a:gd name="adj1" fmla="val -88421"/>
-              <a:gd name="adj2" fmla="val -19208"/>
+              <a:gd name="adj1" fmla="val -90053"/>
+              <a:gd name="adj2" fmla="val -30824"/>
               <a:gd name="adj3" fmla="val 16667"/>
             </a:avLst>
           </a:prstGeom>
@@ -5972,6 +5972,21 @@
                 <a:latin typeface="Montserrat" pitchFamily="2" charset="77"/>
               </a:rPr>
               <a:t>Automatic credentials rotation</a:t>
+            </a:r>
+          </a:p>
+          <a:p>
+            <a:pPr algn="ctr"/>
+            <a:endParaRPr lang="en-US" b="1" dirty="0">
+              <a:latin typeface="Montserrat" pitchFamily="2" charset="77"/>
+            </a:endParaRPr>
+          </a:p>
+          <a:p>
+            <a:pPr algn="ctr"/>
+            <a:r>
+              <a:rPr lang="en-US" b="1" dirty="0">
+                <a:latin typeface="Montserrat" pitchFamily="2" charset="77"/>
+              </a:rPr>
+              <a:t>Integrates with other AWS services</a:t>
             </a:r>
           </a:p>
         </p:txBody>
@@ -9298,7 +9313,7 @@
         </p:nvGrpSpPr>
         <p:grpSpPr>
           <a:xfrm>
-            <a:off x="6620805" y="2399820"/>
+            <a:off x="5736885" y="2308380"/>
             <a:ext cx="4853883" cy="2609856"/>
             <a:chOff x="6022664" y="1494631"/>
             <a:chExt cx="4853883" cy="2609856"/>
@@ -9434,6 +9449,201 @@
           </p:spPr>
         </p:pic>
       </p:grpSp>
+      <p:grpSp>
+        <p:nvGrpSpPr>
+          <p:cNvPr id="7" name="Group 6">
+            <a:extLst>
+              <a:ext uri="{FF2B5EF4-FFF2-40B4-BE49-F238E27FC236}">
+                <a16:creationId xmlns:a16="http://schemas.microsoft.com/office/drawing/2014/main" id="{AB82B223-B90A-C44A-9A6E-D4E7711F76E7}"/>
+              </a:ext>
+            </a:extLst>
+          </p:cNvPr>
+          <p:cNvGrpSpPr/>
+          <p:nvPr/>
+        </p:nvGrpSpPr>
+        <p:grpSpPr>
+          <a:xfrm>
+            <a:off x="6209325" y="2727480"/>
+            <a:ext cx="4853883" cy="2609856"/>
+            <a:chOff x="6022664" y="1494631"/>
+            <a:chExt cx="4853883" cy="2609856"/>
+          </a:xfrm>
+          <a:solidFill>
+            <a:schemeClr val="bg1"/>
+          </a:solidFill>
+        </p:grpSpPr>
+        <p:sp>
+          <p:nvSpPr>
+            <p:cNvPr id="8" name="Rectangle 7">
+              <a:extLst>
+                <a:ext uri="{FF2B5EF4-FFF2-40B4-BE49-F238E27FC236}">
+                  <a16:creationId xmlns:a16="http://schemas.microsoft.com/office/drawing/2014/main" id="{0FA840EB-61D3-5346-99C5-F27A0FD5FFD7}"/>
+                </a:ext>
+              </a:extLst>
+            </p:cNvPr>
+            <p:cNvSpPr/>
+            <p:nvPr/>
+          </p:nvSpPr>
+          <p:spPr>
+            <a:xfrm>
+              <a:off x="6022664" y="1494631"/>
+              <a:ext cx="4853883" cy="2609856"/>
+            </a:xfrm>
+            <a:prstGeom prst="rect">
+              <a:avLst/>
+            </a:prstGeom>
+            <a:grpFill/>
+            <a:ln w="12700">
+              <a:solidFill>
+                <a:schemeClr val="tx1"/>
+              </a:solidFill>
+            </a:ln>
+          </p:spPr>
+          <p:style>
+            <a:lnRef idx="2">
+              <a:schemeClr val="accent1">
+                <a:shade val="50000"/>
+              </a:schemeClr>
+            </a:lnRef>
+            <a:fillRef idx="1">
+              <a:schemeClr val="accent1"/>
+            </a:fillRef>
+            <a:effectRef idx="0">
+              <a:schemeClr val="accent1"/>
+            </a:effectRef>
+            <a:fontRef idx="minor">
+              <a:schemeClr val="lt1"/>
+            </a:fontRef>
+          </p:style>
+          <p:txBody>
+            <a:bodyPr lIns="457200" tIns="91440"/>
+            <a:lstStyle/>
+            <a:p>
+              <a:pPr eaLnBrk="1" fontAlgn="auto" hangingPunct="1">
+                <a:spcBef>
+                  <a:spcPts val="0"/>
+                </a:spcBef>
+                <a:spcAft>
+                  <a:spcPts val="0"/>
+                </a:spcAft>
+                <a:defRPr/>
+              </a:pPr>
+              <a:r>
+                <a:rPr lang="en-US" sz="1200" dirty="0">
+                  <a:solidFill>
+                    <a:sysClr val="windowText" lastClr="000000"/>
+                  </a:solidFill>
+                  <a:latin typeface="Arial" panose="020B0604020202020204" pitchFamily="34" charset="0"/>
+                  <a:cs typeface="Arial" panose="020B0604020202020204" pitchFamily="34" charset="0"/>
+                </a:rPr>
+                <a:t>AWS Cloud Account – Production</a:t>
+              </a:r>
+            </a:p>
+          </p:txBody>
+        </p:sp>
+        <p:pic>
+          <p:nvPicPr>
+            <p:cNvPr id="9" name="Graphic 5">
+              <a:extLst>
+                <a:ext uri="{FF2B5EF4-FFF2-40B4-BE49-F238E27FC236}">
+                  <a16:creationId xmlns:a16="http://schemas.microsoft.com/office/drawing/2014/main" id="{04F0A62A-E4F0-0A4F-9884-881E755A1DEB}"/>
+                </a:ext>
+              </a:extLst>
+            </p:cNvPr>
+            <p:cNvPicPr>
+              <a:picLocks noChangeAspect="1" noChangeArrowheads="1"/>
+            </p:cNvPicPr>
+            <p:nvPr/>
+          </p:nvPicPr>
+          <p:blipFill>
+            <a:blip r:embed="rId2">
+              <a:extLst>
+                <a:ext uri="{28A0092B-C50C-407E-A947-70E740481C1C}">
+                  <a14:useLocalDpi xmlns:a14="http://schemas.microsoft.com/office/drawing/2010/main" val="0"/>
+                </a:ext>
+              </a:extLst>
+            </a:blip>
+            <a:srcRect/>
+            <a:stretch>
+              <a:fillRect/>
+            </a:stretch>
+          </p:blipFill>
+          <p:spPr bwMode="auto">
+            <a:xfrm>
+              <a:off x="6022664" y="1494631"/>
+              <a:ext cx="330200" cy="330200"/>
+            </a:xfrm>
+            <a:prstGeom prst="rect">
+              <a:avLst/>
+            </a:prstGeom>
+            <a:grpFill/>
+            <a:ln>
+              <a:noFill/>
+            </a:ln>
+            <a:extLst>
+              <a:ext uri="{909E8E84-426E-40DD-AFC4-6F175D3DCCD1}">
+                <a14:hiddenFill xmlns:a14="http://schemas.microsoft.com/office/drawing/2010/main">
+                  <a:solidFill>
+                    <a:srgbClr val="FFFFFF"/>
+                  </a:solidFill>
+                </a14:hiddenFill>
+              </a:ext>
+              <a:ext uri="{91240B29-F687-4F45-9708-019B960494DF}">
+                <a14:hiddenLine xmlns:a14="http://schemas.microsoft.com/office/drawing/2010/main" w="9525">
+                  <a:solidFill>
+                    <a:srgbClr val="000000"/>
+                  </a:solidFill>
+                  <a:miter lim="800000"/>
+                  <a:headEnd/>
+                  <a:tailEnd/>
+                </a14:hiddenLine>
+              </a:ext>
+            </a:extLst>
+          </p:spPr>
+        </p:pic>
+      </p:grpSp>
+      <p:sp>
+        <p:nvSpPr>
+          <p:cNvPr id="10" name="TextBox 9">
+            <a:extLst>
+              <a:ext uri="{FF2B5EF4-FFF2-40B4-BE49-F238E27FC236}">
+                <a16:creationId xmlns:a16="http://schemas.microsoft.com/office/drawing/2014/main" id="{62031A57-CD67-464B-AE89-2CFA3D8305D8}"/>
+              </a:ext>
+            </a:extLst>
+          </p:cNvPr>
+          <p:cNvSpPr txBox="1"/>
+          <p:nvPr/>
+        </p:nvSpPr>
+        <p:spPr>
+          <a:xfrm>
+            <a:off x="7537447" y="2353961"/>
+            <a:ext cx="1215397" cy="276999"/>
+          </a:xfrm>
+          <a:prstGeom prst="rect">
+            <a:avLst/>
+          </a:prstGeom>
+          <a:noFill/>
+        </p:spPr>
+        <p:txBody>
+          <a:bodyPr wrap="none" rtlCol="0">
+            <a:spAutoFit/>
+          </a:bodyPr>
+          <a:lstStyle/>
+          <a:p>
+            <a:r>
+              <a:rPr lang="en-US" sz="1200" dirty="0">
+                <a:solidFill>
+                  <a:sysClr val="windowText" lastClr="000000"/>
+                </a:solidFill>
+                <a:latin typeface="Arial" panose="020B0604020202020204" pitchFamily="34" charset="0"/>
+                <a:cs typeface="Arial" panose="020B0604020202020204" pitchFamily="34" charset="0"/>
+              </a:rPr>
+              <a:t>– Development</a:t>
+            </a:r>
+            <a:endParaRPr lang="en-US" sz="1200" dirty="0"/>
+          </a:p>
+        </p:txBody>
+      </p:sp>
     </p:spTree>
     <p:extLst>
       <p:ext uri="{BB962C8B-B14F-4D97-AF65-F5344CB8AC3E}">
@@ -9444,6 +9654,421 @@
   <p:clrMapOvr>
     <a:masterClrMapping/>
   </p:clrMapOvr>
+  <p:timing>
+    <p:tnLst>
+      <p:par>
+        <p:cTn id="1" dur="indefinite" restart="never" nodeType="tmRoot">
+          <p:childTnLst>
+            <p:seq concurrent="1" nextAc="seek">
+              <p:cTn id="2" dur="indefinite" nodeType="mainSeq">
+                <p:childTnLst>
+                  <p:par>
+                    <p:cTn id="3" fill="hold">
+                      <p:stCondLst>
+                        <p:cond delay="indefinite"/>
+                      </p:stCondLst>
+                      <p:childTnLst>
+                        <p:par>
+                          <p:cTn id="4" fill="hold">
+                            <p:stCondLst>
+                              <p:cond delay="0"/>
+                            </p:stCondLst>
+                            <p:childTnLst>
+                              <p:par>
+                                <p:cTn id="5" presetID="10" presetClass="entr" presetSubtype="0" fill="hold" nodeType="clickEffect">
+                                  <p:stCondLst>
+                                    <p:cond delay="0"/>
+                                  </p:stCondLst>
+                                  <p:childTnLst>
+                                    <p:set>
+                                      <p:cBhvr>
+                                        <p:cTn id="6" dur="1" fill="hold">
+                                          <p:stCondLst>
+                                            <p:cond delay="0"/>
+                                          </p:stCondLst>
+                                        </p:cTn>
+                                        <p:tgtEl>
+                                          <p:spTgt spid="3">
+                                            <p:txEl>
+                                              <p:pRg st="2" end="2"/>
+                                            </p:txEl>
+                                          </p:spTgt>
+                                        </p:tgtEl>
+                                        <p:attrNameLst>
+                                          <p:attrName>style.visibility</p:attrName>
+                                        </p:attrNameLst>
+                                      </p:cBhvr>
+                                      <p:to>
+                                        <p:strVal val="visible"/>
+                                      </p:to>
+                                    </p:set>
+                                    <p:animEffect transition="in" filter="fade">
+                                      <p:cBhvr>
+                                        <p:cTn id="7" dur="500"/>
+                                        <p:tgtEl>
+                                          <p:spTgt spid="3">
+                                            <p:txEl>
+                                              <p:pRg st="2" end="2"/>
+                                            </p:txEl>
+                                          </p:spTgt>
+                                        </p:tgtEl>
+                                      </p:cBhvr>
+                                    </p:animEffect>
+                                  </p:childTnLst>
+                                </p:cTn>
+                              </p:par>
+                              <p:par>
+                                <p:cTn id="8" presetID="10" presetClass="entr" presetSubtype="0" fill="hold" nodeType="withEffect">
+                                  <p:stCondLst>
+                                    <p:cond delay="0"/>
+                                  </p:stCondLst>
+                                  <p:childTnLst>
+                                    <p:set>
+                                      <p:cBhvr>
+                                        <p:cTn id="9" dur="1" fill="hold">
+                                          <p:stCondLst>
+                                            <p:cond delay="0"/>
+                                          </p:stCondLst>
+                                        </p:cTn>
+                                        <p:tgtEl>
+                                          <p:spTgt spid="3">
+                                            <p:txEl>
+                                              <p:pRg st="3" end="3"/>
+                                            </p:txEl>
+                                          </p:spTgt>
+                                        </p:tgtEl>
+                                        <p:attrNameLst>
+                                          <p:attrName>style.visibility</p:attrName>
+                                        </p:attrNameLst>
+                                      </p:cBhvr>
+                                      <p:to>
+                                        <p:strVal val="visible"/>
+                                      </p:to>
+                                    </p:set>
+                                    <p:animEffect transition="in" filter="fade">
+                                      <p:cBhvr>
+                                        <p:cTn id="10" dur="500"/>
+                                        <p:tgtEl>
+                                          <p:spTgt spid="3">
+                                            <p:txEl>
+                                              <p:pRg st="3" end="3"/>
+                                            </p:txEl>
+                                          </p:spTgt>
+                                        </p:tgtEl>
+                                      </p:cBhvr>
+                                    </p:animEffect>
+                                  </p:childTnLst>
+                                </p:cTn>
+                              </p:par>
+                            </p:childTnLst>
+                          </p:cTn>
+                        </p:par>
+                      </p:childTnLst>
+                    </p:cTn>
+                  </p:par>
+                  <p:par>
+                    <p:cTn id="11" fill="hold">
+                      <p:stCondLst>
+                        <p:cond delay="indefinite"/>
+                      </p:stCondLst>
+                      <p:childTnLst>
+                        <p:par>
+                          <p:cTn id="12" fill="hold">
+                            <p:stCondLst>
+                              <p:cond delay="0"/>
+                            </p:stCondLst>
+                            <p:childTnLst>
+                              <p:par>
+                                <p:cTn id="13" presetID="10" presetClass="entr" presetSubtype="0" fill="hold" nodeType="clickEffect">
+                                  <p:stCondLst>
+                                    <p:cond delay="0"/>
+                                  </p:stCondLst>
+                                  <p:childTnLst>
+                                    <p:set>
+                                      <p:cBhvr>
+                                        <p:cTn id="14" dur="1" fill="hold">
+                                          <p:stCondLst>
+                                            <p:cond delay="0"/>
+                                          </p:stCondLst>
+                                        </p:cTn>
+                                        <p:tgtEl>
+                                          <p:spTgt spid="3">
+                                            <p:txEl>
+                                              <p:pRg st="5" end="5"/>
+                                            </p:txEl>
+                                          </p:spTgt>
+                                        </p:tgtEl>
+                                        <p:attrNameLst>
+                                          <p:attrName>style.visibility</p:attrName>
+                                        </p:attrNameLst>
+                                      </p:cBhvr>
+                                      <p:to>
+                                        <p:strVal val="visible"/>
+                                      </p:to>
+                                    </p:set>
+                                    <p:animEffect transition="in" filter="fade">
+                                      <p:cBhvr>
+                                        <p:cTn id="15" dur="500"/>
+                                        <p:tgtEl>
+                                          <p:spTgt spid="3">
+                                            <p:txEl>
+                                              <p:pRg st="5" end="5"/>
+                                            </p:txEl>
+                                          </p:spTgt>
+                                        </p:tgtEl>
+                                      </p:cBhvr>
+                                    </p:animEffect>
+                                  </p:childTnLst>
+                                </p:cTn>
+                              </p:par>
+                              <p:par>
+                                <p:cTn id="16" presetID="10" presetClass="entr" presetSubtype="0" fill="hold" nodeType="withEffect">
+                                  <p:stCondLst>
+                                    <p:cond delay="0"/>
+                                  </p:stCondLst>
+                                  <p:childTnLst>
+                                    <p:set>
+                                      <p:cBhvr>
+                                        <p:cTn id="17" dur="1" fill="hold">
+                                          <p:stCondLst>
+                                            <p:cond delay="0"/>
+                                          </p:stCondLst>
+                                        </p:cTn>
+                                        <p:tgtEl>
+                                          <p:spTgt spid="3">
+                                            <p:txEl>
+                                              <p:pRg st="6" end="6"/>
+                                            </p:txEl>
+                                          </p:spTgt>
+                                        </p:tgtEl>
+                                        <p:attrNameLst>
+                                          <p:attrName>style.visibility</p:attrName>
+                                        </p:attrNameLst>
+                                      </p:cBhvr>
+                                      <p:to>
+                                        <p:strVal val="visible"/>
+                                      </p:to>
+                                    </p:set>
+                                    <p:animEffect transition="in" filter="fade">
+                                      <p:cBhvr>
+                                        <p:cTn id="18" dur="500"/>
+                                        <p:tgtEl>
+                                          <p:spTgt spid="3">
+                                            <p:txEl>
+                                              <p:pRg st="6" end="6"/>
+                                            </p:txEl>
+                                          </p:spTgt>
+                                        </p:tgtEl>
+                                      </p:cBhvr>
+                                    </p:animEffect>
+                                  </p:childTnLst>
+                                </p:cTn>
+                              </p:par>
+                              <p:par>
+                                <p:cTn id="19" presetID="10" presetClass="entr" presetSubtype="0" fill="hold" nodeType="withEffect">
+                                  <p:stCondLst>
+                                    <p:cond delay="0"/>
+                                  </p:stCondLst>
+                                  <p:childTnLst>
+                                    <p:set>
+                                      <p:cBhvr>
+                                        <p:cTn id="20" dur="1" fill="hold">
+                                          <p:stCondLst>
+                                            <p:cond delay="0"/>
+                                          </p:stCondLst>
+                                        </p:cTn>
+                                        <p:tgtEl>
+                                          <p:spTgt spid="3">
+                                            <p:txEl>
+                                              <p:pRg st="7" end="7"/>
+                                            </p:txEl>
+                                          </p:spTgt>
+                                        </p:tgtEl>
+                                        <p:attrNameLst>
+                                          <p:attrName>style.visibility</p:attrName>
+                                        </p:attrNameLst>
+                                      </p:cBhvr>
+                                      <p:to>
+                                        <p:strVal val="visible"/>
+                                      </p:to>
+                                    </p:set>
+                                    <p:animEffect transition="in" filter="fade">
+                                      <p:cBhvr>
+                                        <p:cTn id="21" dur="500"/>
+                                        <p:tgtEl>
+                                          <p:spTgt spid="3">
+                                            <p:txEl>
+                                              <p:pRg st="7" end="7"/>
+                                            </p:txEl>
+                                          </p:spTgt>
+                                        </p:tgtEl>
+                                      </p:cBhvr>
+                                    </p:animEffect>
+                                  </p:childTnLst>
+                                </p:cTn>
+                              </p:par>
+                              <p:par>
+                                <p:cTn id="22" presetID="10" presetClass="entr" presetSubtype="0" fill="hold" grpId="0" nodeType="withEffect">
+                                  <p:stCondLst>
+                                    <p:cond delay="0"/>
+                                  </p:stCondLst>
+                                  <p:childTnLst>
+                                    <p:set>
+                                      <p:cBhvr>
+                                        <p:cTn id="23" dur="1" fill="hold">
+                                          <p:stCondLst>
+                                            <p:cond delay="0"/>
+                                          </p:stCondLst>
+                                        </p:cTn>
+                                        <p:tgtEl>
+                                          <p:spTgt spid="10"/>
+                                        </p:tgtEl>
+                                        <p:attrNameLst>
+                                          <p:attrName>style.visibility</p:attrName>
+                                        </p:attrNameLst>
+                                      </p:cBhvr>
+                                      <p:to>
+                                        <p:strVal val="visible"/>
+                                      </p:to>
+                                    </p:set>
+                                    <p:animEffect transition="in" filter="fade">
+                                      <p:cBhvr>
+                                        <p:cTn id="24" dur="500"/>
+                                        <p:tgtEl>
+                                          <p:spTgt spid="10"/>
+                                        </p:tgtEl>
+                                      </p:cBhvr>
+                                    </p:animEffect>
+                                  </p:childTnLst>
+                                </p:cTn>
+                              </p:par>
+                              <p:par>
+                                <p:cTn id="25" presetID="10" presetClass="entr" presetSubtype="0" fill="hold" nodeType="withEffect">
+                                  <p:stCondLst>
+                                    <p:cond delay="0"/>
+                                  </p:stCondLst>
+                                  <p:childTnLst>
+                                    <p:set>
+                                      <p:cBhvr>
+                                        <p:cTn id="26" dur="1" fill="hold">
+                                          <p:stCondLst>
+                                            <p:cond delay="0"/>
+                                          </p:stCondLst>
+                                        </p:cTn>
+                                        <p:tgtEl>
+                                          <p:spTgt spid="7"/>
+                                        </p:tgtEl>
+                                        <p:attrNameLst>
+                                          <p:attrName>style.visibility</p:attrName>
+                                        </p:attrNameLst>
+                                      </p:cBhvr>
+                                      <p:to>
+                                        <p:strVal val="visible"/>
+                                      </p:to>
+                                    </p:set>
+                                    <p:animEffect transition="in" filter="fade">
+                                      <p:cBhvr>
+                                        <p:cTn id="27" dur="500"/>
+                                        <p:tgtEl>
+                                          <p:spTgt spid="7"/>
+                                        </p:tgtEl>
+                                      </p:cBhvr>
+                                    </p:animEffect>
+                                  </p:childTnLst>
+                                </p:cTn>
+                              </p:par>
+                            </p:childTnLst>
+                          </p:cTn>
+                        </p:par>
+                      </p:childTnLst>
+                    </p:cTn>
+                  </p:par>
+                  <p:par>
+                    <p:cTn id="28" fill="hold">
+                      <p:stCondLst>
+                        <p:cond delay="indefinite"/>
+                      </p:stCondLst>
+                      <p:childTnLst>
+                        <p:par>
+                          <p:cTn id="29" fill="hold">
+                            <p:stCondLst>
+                              <p:cond delay="0"/>
+                            </p:stCondLst>
+                            <p:childTnLst>
+                              <p:par>
+                                <p:cTn id="30" presetID="10" presetClass="entr" presetSubtype="0" fill="hold" nodeType="clickEffect">
+                                  <p:stCondLst>
+                                    <p:cond delay="0"/>
+                                  </p:stCondLst>
+                                  <p:childTnLst>
+                                    <p:set>
+                                      <p:cBhvr>
+                                        <p:cTn id="31" dur="1" fill="hold">
+                                          <p:stCondLst>
+                                            <p:cond delay="0"/>
+                                          </p:stCondLst>
+                                        </p:cTn>
+                                        <p:tgtEl>
+                                          <p:spTgt spid="3">
+                                            <p:txEl>
+                                              <p:pRg st="9" end="9"/>
+                                            </p:txEl>
+                                          </p:spTgt>
+                                        </p:tgtEl>
+                                        <p:attrNameLst>
+                                          <p:attrName>style.visibility</p:attrName>
+                                        </p:attrNameLst>
+                                      </p:cBhvr>
+                                      <p:to>
+                                        <p:strVal val="visible"/>
+                                      </p:to>
+                                    </p:set>
+                                    <p:animEffect transition="in" filter="fade">
+                                      <p:cBhvr>
+                                        <p:cTn id="32" dur="500"/>
+                                        <p:tgtEl>
+                                          <p:spTgt spid="3">
+                                            <p:txEl>
+                                              <p:pRg st="9" end="9"/>
+                                            </p:txEl>
+                                          </p:spTgt>
+                                        </p:tgtEl>
+                                      </p:cBhvr>
+                                    </p:animEffect>
+                                  </p:childTnLst>
+                                </p:cTn>
+                              </p:par>
+                            </p:childTnLst>
+                          </p:cTn>
+                        </p:par>
+                      </p:childTnLst>
+                    </p:cTn>
+                  </p:par>
+                </p:childTnLst>
+              </p:cTn>
+              <p:prevCondLst>
+                <p:cond evt="onPrev" delay="0">
+                  <p:tgtEl>
+                    <p:sldTgt/>
+                  </p:tgtEl>
+                </p:cond>
+              </p:prevCondLst>
+              <p:nextCondLst>
+                <p:cond evt="onNext" delay="0">
+                  <p:tgtEl>
+                    <p:sldTgt/>
+                  </p:tgtEl>
+                </p:cond>
+              </p:nextCondLst>
+            </p:seq>
+          </p:childTnLst>
+        </p:cTn>
+      </p:par>
+    </p:tnLst>
+    <p:bldLst>
+      <p:bldP spid="10" grpId="0"/>
+    </p:bldLst>
+  </p:timing>
 </p:sld>
 </file>
 
@@ -11094,8 +11719,8 @@
         </p:nvSpPr>
         <p:spPr>
           <a:xfrm>
-            <a:off x="4875970" y="2045621"/>
-            <a:ext cx="1073150" cy="519300"/>
+            <a:off x="4875970" y="2132945"/>
+            <a:ext cx="880774" cy="431976"/>
           </a:xfrm>
           <a:prstGeom prst="rect">
             <a:avLst/>
@@ -11129,7 +11754,7 @@
           <a:p>
             <a:pPr algn="ctr"/>
             <a:r>
-              <a:rPr lang="en-US" sz="1400" dirty="0">
+              <a:rPr lang="en-US" sz="1200" dirty="0">
                 <a:solidFill>
                   <a:srgbClr val="002060"/>
                 </a:solidFill>
@@ -11154,8 +11779,8 @@
         </p:nvSpPr>
         <p:spPr>
           <a:xfrm>
-            <a:off x="4558384" y="2813704"/>
-            <a:ext cx="1073150" cy="519300"/>
+            <a:off x="4582229" y="2864327"/>
+            <a:ext cx="880774" cy="431976"/>
           </a:xfrm>
           <a:prstGeom prst="rect">
             <a:avLst/>
@@ -11189,7 +11814,7 @@
           <a:p>
             <a:pPr algn="ctr"/>
             <a:r>
-              <a:rPr lang="en-US" sz="1400" dirty="0">
+              <a:rPr lang="en-US" sz="1200" dirty="0">
                 <a:solidFill>
                   <a:srgbClr val="002060"/>
                 </a:solidFill>
@@ -11214,8 +11839,8 @@
         </p:nvSpPr>
         <p:spPr>
           <a:xfrm>
-            <a:off x="4903207" y="3606939"/>
-            <a:ext cx="1073150" cy="519300"/>
+            <a:off x="4903207" y="3694263"/>
+            <a:ext cx="880774" cy="431976"/>
           </a:xfrm>
           <a:prstGeom prst="rect">
             <a:avLst/>
@@ -11249,7 +11874,7 @@
           <a:p>
             <a:pPr algn="ctr"/>
             <a:r>
-              <a:rPr lang="en-US" sz="1400" dirty="0">
+              <a:rPr lang="en-US" sz="1200" dirty="0">
                 <a:solidFill>
                   <a:srgbClr val="002060"/>
                 </a:solidFill>
@@ -11282,6 +11907,9 @@
                     <p:cTn id="3" fill="hold">
                       <p:stCondLst>
                         <p:cond delay="indefinite"/>
+                        <p:cond evt="onBegin" delay="0">
+                          <p:tn val="2"/>
+                        </p:cond>
                       </p:stCondLst>
                       <p:childTnLst>
                         <p:par>
@@ -11291,7 +11919,7 @@
                             </p:stCondLst>
                             <p:childTnLst>
                               <p:par>
-                                <p:cTn id="5" presetID="10" presetClass="entr" presetSubtype="0" fill="hold" grpId="0" nodeType="clickEffect">
+                                <p:cTn id="5" presetID="10" presetClass="entr" presetSubtype="0" fill="hold" grpId="0" nodeType="afterEffect">
                                   <p:stCondLst>
                                     <p:cond delay="0"/>
                                   </p:stCondLst>

</xml_diff>